<commit_message>
Last touches on the Presentation
</commit_message>
<xml_diff>
--- a/docs/Plan B.pptx
+++ b/docs/Plan B.pptx
@@ -119,8 +119,8 @@
 <file path=ppt/revisionInfo.xml><?xml version="1.0" encoding="utf-8"?>
 <p1510:revInfo xmlns:a="http://schemas.openxmlformats.org/drawingml/2006/main" xmlns:r="http://schemas.openxmlformats.org/officeDocument/2006/relationships" xmlns:p1510="http://schemas.microsoft.com/office/powerpoint/2015/10/main">
   <p1510:revLst>
+    <p1510:client id="{08FC3D5A-70AB-147D-73F6-91F1ED937901}" v="28" dt="2024-11-04T21:10:29.061"/>
     <p1510:client id="{20FBC904-BABB-EF56-E218-B7B9A1F79532}" v="472" dt="2024-11-03T10:22:40.136"/>
-    <p1510:client id="{D09F25B2-FD72-22B6-737B-25F0F1BD8A73}" v="65" dt="2024-11-02T20:07:20.203"/>
   </p1510:revLst>
 </p1510:revInfo>
 </file>
@@ -256,7 +256,7 @@
           <a:p>
             <a:fld id="{846CE7D5-CF57-46EF-B807-FDD0502418D4}" type="datetimeFigureOut">
               <a:rPr lang="en-US" smtClean="0"/>
-              <a:t>11/3/2024</a:t>
+              <a:t>11/4/2024</a:t>
             </a:fld>
             <a:endParaRPr lang="en-US"/>
           </a:p>
@@ -426,7 +426,7 @@
           <a:p>
             <a:fld id="{846CE7D5-CF57-46EF-B807-FDD0502418D4}" type="datetimeFigureOut">
               <a:rPr lang="en-US" smtClean="0"/>
-              <a:t>11/3/2024</a:t>
+              <a:t>11/4/2024</a:t>
             </a:fld>
             <a:endParaRPr lang="en-US"/>
           </a:p>
@@ -606,7 +606,7 @@
           <a:p>
             <a:fld id="{846CE7D5-CF57-46EF-B807-FDD0502418D4}" type="datetimeFigureOut">
               <a:rPr lang="en-US" smtClean="0"/>
-              <a:t>11/3/2024</a:t>
+              <a:t>11/4/2024</a:t>
             </a:fld>
             <a:endParaRPr lang="en-US"/>
           </a:p>
@@ -776,7 +776,7 @@
           <a:p>
             <a:fld id="{846CE7D5-CF57-46EF-B807-FDD0502418D4}" type="datetimeFigureOut">
               <a:rPr lang="en-US" smtClean="0"/>
-              <a:t>11/3/2024</a:t>
+              <a:t>11/4/2024</a:t>
             </a:fld>
             <a:endParaRPr lang="en-US"/>
           </a:p>
@@ -1022,7 +1022,7 @@
           <a:p>
             <a:fld id="{846CE7D5-CF57-46EF-B807-FDD0502418D4}" type="datetimeFigureOut">
               <a:rPr lang="en-US" smtClean="0"/>
-              <a:t>11/3/2024</a:t>
+              <a:t>11/4/2024</a:t>
             </a:fld>
             <a:endParaRPr lang="en-US"/>
           </a:p>
@@ -1254,7 +1254,7 @@
           <a:p>
             <a:fld id="{846CE7D5-CF57-46EF-B807-FDD0502418D4}" type="datetimeFigureOut">
               <a:rPr lang="en-US" smtClean="0"/>
-              <a:t>11/3/2024</a:t>
+              <a:t>11/4/2024</a:t>
             </a:fld>
             <a:endParaRPr lang="en-US"/>
           </a:p>
@@ -1621,7 +1621,7 @@
           <a:p>
             <a:fld id="{846CE7D5-CF57-46EF-B807-FDD0502418D4}" type="datetimeFigureOut">
               <a:rPr lang="en-US" smtClean="0"/>
-              <a:t>11/3/2024</a:t>
+              <a:t>11/4/2024</a:t>
             </a:fld>
             <a:endParaRPr lang="en-US"/>
           </a:p>
@@ -1739,7 +1739,7 @@
           <a:p>
             <a:fld id="{846CE7D5-CF57-46EF-B807-FDD0502418D4}" type="datetimeFigureOut">
               <a:rPr lang="en-US" smtClean="0"/>
-              <a:t>11/3/2024</a:t>
+              <a:t>11/4/2024</a:t>
             </a:fld>
             <a:endParaRPr lang="en-US"/>
           </a:p>
@@ -1834,7 +1834,7 @@
           <a:p>
             <a:fld id="{846CE7D5-CF57-46EF-B807-FDD0502418D4}" type="datetimeFigureOut">
               <a:rPr lang="en-US" smtClean="0"/>
-              <a:t>11/3/2024</a:t>
+              <a:t>11/4/2024</a:t>
             </a:fld>
             <a:endParaRPr lang="en-US"/>
           </a:p>
@@ -2111,7 +2111,7 @@
           <a:p>
             <a:fld id="{846CE7D5-CF57-46EF-B807-FDD0502418D4}" type="datetimeFigureOut">
               <a:rPr lang="en-US" smtClean="0"/>
-              <a:t>11/3/2024</a:t>
+              <a:t>11/4/2024</a:t>
             </a:fld>
             <a:endParaRPr lang="en-US"/>
           </a:p>
@@ -2368,7 +2368,7 @@
           <a:p>
             <a:fld id="{846CE7D5-CF57-46EF-B807-FDD0502418D4}" type="datetimeFigureOut">
               <a:rPr lang="en-US" smtClean="0"/>
-              <a:t>11/3/2024</a:t>
+              <a:t>11/4/2024</a:t>
             </a:fld>
             <a:endParaRPr lang="en-US"/>
           </a:p>
@@ -2581,7 +2581,7 @@
           <a:p>
             <a:fld id="{846CE7D5-CF57-46EF-B807-FDD0502418D4}" type="datetimeFigureOut">
               <a:rPr lang="en-US" smtClean="0"/>
-              <a:t>11/3/2024</a:t>
+              <a:t>11/4/2024</a:t>
             </a:fld>
             <a:endParaRPr lang="en-US"/>
           </a:p>
@@ -5980,13 +5980,13 @@
           <a:lstStyle/>
           <a:p>
             <a:r>
-              <a:rPr lang="en-US" sz="2400">
+              <a:rPr lang="en-US" sz="2400" dirty="0">
                 <a:ea typeface="+mn-lt"/>
                 <a:cs typeface="+mn-lt"/>
               </a:rPr>
-              <a:t>Our project is a console application, that make it easy and understandable for the students to learn new information about the basic subjects in school, so they can have better general knowledge.</a:t>
-            </a:r>
-            <a:endParaRPr lang="en-US" sz="2400"/>
+              <a:t>Our project is a console application, that make it easy and understandable for the people who are learning new information about the basic Finance Challenges, so they can have better general knowledge.</a:t>
+            </a:r>
+            <a:endParaRPr lang="en-US" sz="2400" dirty="0"/>
           </a:p>
           <a:p>
             <a:endParaRPr lang="en-US" sz="2400"/>

</xml_diff>